<commit_message>
Log update & stacking layer figure update
</commit_message>
<xml_diff>
--- a/documents/stacking_layer.pptx
+++ b/documents/stacking_layer.pptx
@@ -104,6 +104,11 @@
       </a:defRPr>
     </a:lvl9pPr>
   </p:defaultTextStyle>
+  <p:extLst>
+    <p:ext uri="{EFAFB233-063F-42B5-8137-9DF3F51BA10A}">
+      <p15:sldGuideLst xmlns:p15="http://schemas.microsoft.com/office/powerpoint/2012/main"/>
+    </p:ext>
+  </p:extLst>
 </p:presentation>
 </file>
 
@@ -258,7 +263,7 @@
           <a:p>
             <a:fld id="{58BFABE9-116B-4421-B689-A4EA4F7DEA38}" type="datetimeFigureOut">
               <a:rPr lang="en-US" smtClean="0"/>
-              <a:t>8/8/2017</a:t>
+              <a:t>8/11/2017</a:t>
             </a:fld>
             <a:endParaRPr lang="en-US"/>
           </a:p>
@@ -456,7 +461,7 @@
           <a:p>
             <a:fld id="{58BFABE9-116B-4421-B689-A4EA4F7DEA38}" type="datetimeFigureOut">
               <a:rPr lang="en-US" smtClean="0"/>
-              <a:t>8/8/2017</a:t>
+              <a:t>8/11/2017</a:t>
             </a:fld>
             <a:endParaRPr lang="en-US"/>
           </a:p>
@@ -664,7 +669,7 @@
           <a:p>
             <a:fld id="{58BFABE9-116B-4421-B689-A4EA4F7DEA38}" type="datetimeFigureOut">
               <a:rPr lang="en-US" smtClean="0"/>
-              <a:t>8/8/2017</a:t>
+              <a:t>8/11/2017</a:t>
             </a:fld>
             <a:endParaRPr lang="en-US"/>
           </a:p>
@@ -862,7 +867,7 @@
           <a:p>
             <a:fld id="{58BFABE9-116B-4421-B689-A4EA4F7DEA38}" type="datetimeFigureOut">
               <a:rPr lang="en-US" smtClean="0"/>
-              <a:t>8/8/2017</a:t>
+              <a:t>8/11/2017</a:t>
             </a:fld>
             <a:endParaRPr lang="en-US"/>
           </a:p>
@@ -1137,7 +1142,7 @@
           <a:p>
             <a:fld id="{58BFABE9-116B-4421-B689-A4EA4F7DEA38}" type="datetimeFigureOut">
               <a:rPr lang="en-US" smtClean="0"/>
-              <a:t>8/8/2017</a:t>
+              <a:t>8/11/2017</a:t>
             </a:fld>
             <a:endParaRPr lang="en-US"/>
           </a:p>
@@ -1402,7 +1407,7 @@
           <a:p>
             <a:fld id="{58BFABE9-116B-4421-B689-A4EA4F7DEA38}" type="datetimeFigureOut">
               <a:rPr lang="en-US" smtClean="0"/>
-              <a:t>8/8/2017</a:t>
+              <a:t>8/11/2017</a:t>
             </a:fld>
             <a:endParaRPr lang="en-US"/>
           </a:p>
@@ -1814,7 +1819,7 @@
           <a:p>
             <a:fld id="{58BFABE9-116B-4421-B689-A4EA4F7DEA38}" type="datetimeFigureOut">
               <a:rPr lang="en-US" smtClean="0"/>
-              <a:t>8/8/2017</a:t>
+              <a:t>8/11/2017</a:t>
             </a:fld>
             <a:endParaRPr lang="en-US"/>
           </a:p>
@@ -1955,7 +1960,7 @@
           <a:p>
             <a:fld id="{58BFABE9-116B-4421-B689-A4EA4F7DEA38}" type="datetimeFigureOut">
               <a:rPr lang="en-US" smtClean="0"/>
-              <a:t>8/8/2017</a:t>
+              <a:t>8/11/2017</a:t>
             </a:fld>
             <a:endParaRPr lang="en-US"/>
           </a:p>
@@ -2068,7 +2073,7 @@
           <a:p>
             <a:fld id="{58BFABE9-116B-4421-B689-A4EA4F7DEA38}" type="datetimeFigureOut">
               <a:rPr lang="en-US" smtClean="0"/>
-              <a:t>8/8/2017</a:t>
+              <a:t>8/11/2017</a:t>
             </a:fld>
             <a:endParaRPr lang="en-US"/>
           </a:p>
@@ -2379,7 +2384,7 @@
           <a:p>
             <a:fld id="{58BFABE9-116B-4421-B689-A4EA4F7DEA38}" type="datetimeFigureOut">
               <a:rPr lang="en-US" smtClean="0"/>
-              <a:t>8/8/2017</a:t>
+              <a:t>8/11/2017</a:t>
             </a:fld>
             <a:endParaRPr lang="en-US"/>
           </a:p>
@@ -2667,7 +2672,7 @@
           <a:p>
             <a:fld id="{58BFABE9-116B-4421-B689-A4EA4F7DEA38}" type="datetimeFigureOut">
               <a:rPr lang="en-US" smtClean="0"/>
-              <a:t>8/8/2017</a:t>
+              <a:t>8/11/2017</a:t>
             </a:fld>
             <a:endParaRPr lang="en-US"/>
           </a:p>
@@ -2908,7 +2913,7 @@
           <a:p>
             <a:fld id="{58BFABE9-116B-4421-B689-A4EA4F7DEA38}" type="datetimeFigureOut">
               <a:rPr lang="en-US" smtClean="0"/>
-              <a:t>8/8/2017</a:t>
+              <a:t>8/11/2017</a:t>
             </a:fld>
             <a:endParaRPr lang="en-US"/>
           </a:p>
@@ -3339,8 +3344,8 @@
         </p:nvSpPr>
         <p:spPr>
           <a:xfrm>
-            <a:off x="426128" y="3799643"/>
-            <a:ext cx="11327907" cy="2982897"/>
+            <a:off x="381738" y="3369762"/>
+            <a:ext cx="11327907" cy="3435109"/>
           </a:xfrm>
           <a:prstGeom prst="roundRect">
             <a:avLst/>
@@ -3366,7 +3371,7 @@
           <a:lstStyle/>
           <a:p>
             <a:pPr algn="ctr"/>
-            <a:endParaRPr lang="en-US"/>
+            <a:endParaRPr lang="en-US" dirty="0"/>
           </a:p>
         </p:txBody>
       </p:sp>
@@ -3384,8 +3389,8 @@
         </p:nvSpPr>
         <p:spPr>
           <a:xfrm>
-            <a:off x="727968" y="4287914"/>
-            <a:ext cx="10635449" cy="2263805"/>
+            <a:off x="727968" y="5468645"/>
+            <a:ext cx="10635449" cy="1083074"/>
           </a:xfrm>
           <a:prstGeom prst="roundRect">
             <a:avLst/>
@@ -3438,7 +3443,7 @@
         </p:nvSpPr>
         <p:spPr>
           <a:xfrm>
-            <a:off x="5046953" y="4103248"/>
+            <a:off x="5091342" y="5309006"/>
             <a:ext cx="1997478" cy="369332"/>
           </a:xfrm>
           <a:prstGeom prst="rect">
@@ -3489,8 +3494,8 @@
         </p:nvSpPr>
         <p:spPr>
           <a:xfrm>
-            <a:off x="923278" y="5145183"/>
-            <a:ext cx="1429305" cy="584775"/>
+            <a:off x="986900" y="5764497"/>
+            <a:ext cx="1429305" cy="400110"/>
           </a:xfrm>
           <a:prstGeom prst="rect">
             <a:avLst/>
@@ -3518,9 +3523,10 @@
           <a:p>
             <a:pPr algn="ctr"/>
             <a:r>
-              <a:rPr lang="en-US" sz="3200" dirty="0"/>
+              <a:rPr lang="en-US" sz="2000" dirty="0"/>
               <a:t>Ridge</a:t>
             </a:r>
+            <a:endParaRPr lang="en-US" sz="3200" dirty="0"/>
           </a:p>
         </p:txBody>
       </p:sp>
@@ -3538,8 +3544,8 @@
         </p:nvSpPr>
         <p:spPr>
           <a:xfrm>
-            <a:off x="2432483" y="5145182"/>
-            <a:ext cx="1518079" cy="1077218"/>
+            <a:off x="2496105" y="5764496"/>
+            <a:ext cx="1518079" cy="707886"/>
           </a:xfrm>
           <a:prstGeom prst="rect">
             <a:avLst/>
@@ -3567,14 +3573,14 @@
           <a:p>
             <a:pPr algn="ctr"/>
             <a:r>
-              <a:rPr lang="en-US" sz="3200" dirty="0"/>
+              <a:rPr lang="en-US" sz="2000" dirty="0"/>
               <a:t>Elastic </a:t>
             </a:r>
           </a:p>
           <a:p>
             <a:pPr algn="ctr"/>
             <a:r>
-              <a:rPr lang="en-US" sz="3200" dirty="0"/>
+              <a:rPr lang="en-US" sz="2000" dirty="0"/>
               <a:t>Net</a:t>
             </a:r>
           </a:p>
@@ -3594,8 +3600,8 @@
         </p:nvSpPr>
         <p:spPr>
           <a:xfrm>
-            <a:off x="4030462" y="5145182"/>
-            <a:ext cx="1757038" cy="1077218"/>
+            <a:off x="4094084" y="5764496"/>
+            <a:ext cx="1757038" cy="707886"/>
           </a:xfrm>
           <a:prstGeom prst="rect">
             <a:avLst/>
@@ -3623,14 +3629,14 @@
           <a:p>
             <a:pPr algn="ctr"/>
             <a:r>
-              <a:rPr lang="en-US" sz="3200" dirty="0"/>
+              <a:rPr lang="en-US" sz="2000" dirty="0"/>
               <a:t>Random</a:t>
             </a:r>
           </a:p>
           <a:p>
             <a:pPr algn="ctr"/>
             <a:r>
-              <a:rPr lang="en-US" sz="3200" dirty="0"/>
+              <a:rPr lang="en-US" sz="2000" dirty="0"/>
               <a:t>Forest</a:t>
             </a:r>
           </a:p>
@@ -3650,8 +3656,8 @@
         </p:nvSpPr>
         <p:spPr>
           <a:xfrm>
-            <a:off x="5867400" y="5132438"/>
-            <a:ext cx="1694895" cy="1077218"/>
+            <a:off x="5931022" y="5751752"/>
+            <a:ext cx="1694895" cy="707886"/>
           </a:xfrm>
           <a:prstGeom prst="rect">
             <a:avLst/>
@@ -3679,14 +3685,14 @@
           <a:p>
             <a:pPr algn="ctr"/>
             <a:r>
-              <a:rPr lang="en-US" sz="3200" dirty="0"/>
+              <a:rPr lang="en-US" sz="2000" dirty="0"/>
               <a:t>Extra </a:t>
             </a:r>
           </a:p>
           <a:p>
             <a:pPr algn="ctr"/>
             <a:r>
-              <a:rPr lang="en-US" sz="3200" dirty="0"/>
+              <a:rPr lang="en-US" sz="2000" dirty="0"/>
               <a:t>Tree</a:t>
             </a:r>
           </a:p>
@@ -3706,8 +3712,8 @@
         </p:nvSpPr>
         <p:spPr>
           <a:xfrm>
-            <a:off x="7642195" y="5132438"/>
-            <a:ext cx="1694895" cy="1077218"/>
+            <a:off x="7705817" y="5751752"/>
+            <a:ext cx="1694895" cy="707886"/>
           </a:xfrm>
           <a:prstGeom prst="rect">
             <a:avLst/>
@@ -3735,7 +3741,7 @@
           <a:p>
             <a:pPr algn="ctr"/>
             <a:r>
-              <a:rPr lang="en-US" sz="3200" dirty="0"/>
+              <a:rPr lang="en-US" sz="2000" dirty="0"/>
               <a:t>Gradient Boosting</a:t>
             </a:r>
           </a:p>
@@ -3755,8 +3761,8 @@
         </p:nvSpPr>
         <p:spPr>
           <a:xfrm>
-            <a:off x="9416990" y="5132438"/>
-            <a:ext cx="1694895" cy="1077218"/>
+            <a:off x="9416990" y="5751752"/>
+            <a:ext cx="1694895" cy="707886"/>
           </a:xfrm>
           <a:prstGeom prst="rect">
             <a:avLst/>
@@ -3784,7 +3790,7 @@
           <a:p>
             <a:pPr algn="ctr"/>
             <a:r>
-              <a:rPr lang="en-US" sz="3200" dirty="0"/>
+              <a:rPr lang="en-US" sz="2000" dirty="0"/>
               <a:t>Neural Network</a:t>
             </a:r>
           </a:p>
@@ -3804,7 +3810,7 @@
         </p:nvSpPr>
         <p:spPr>
           <a:xfrm>
-            <a:off x="5046953" y="3614977"/>
+            <a:off x="5091342" y="3177007"/>
             <a:ext cx="1997478" cy="369332"/>
           </a:xfrm>
           <a:prstGeom prst="rect">
@@ -3835,15 +3841,7 @@
             <a:pPr algn="ctr"/>
             <a:r>
               <a:rPr lang="en-US" dirty="0"/>
-              <a:t>1</a:t>
-            </a:r>
-            <a:r>
-              <a:rPr lang="en-US" baseline="30000" dirty="0"/>
-              <a:t>st</a:t>
-            </a:r>
-            <a:r>
-              <a:rPr lang="en-US" dirty="0"/>
-              <a:t> Layer</a:t>
+              <a:t> Stacking Layer</a:t>
             </a:r>
           </a:p>
         </p:txBody>
@@ -3862,7 +3860,7 @@
         </p:nvSpPr>
         <p:spPr>
           <a:xfrm rot="16200000">
-            <a:off x="5824632" y="2857270"/>
+            <a:off x="5824632" y="2389361"/>
             <a:ext cx="442120" cy="980984"/>
           </a:xfrm>
           <a:prstGeom prst="rightArrow">
@@ -3906,7 +3904,7 @@
         </p:nvSpPr>
         <p:spPr>
           <a:xfrm>
-            <a:off x="426128" y="2024109"/>
+            <a:off x="426128" y="1527818"/>
             <a:ext cx="11327907" cy="1102932"/>
           </a:xfrm>
           <a:prstGeom prst="roundRect">
@@ -3951,7 +3949,7 @@
         </p:nvSpPr>
         <p:spPr>
           <a:xfrm rot="16200000">
-            <a:off x="5824632" y="1081736"/>
+            <a:off x="5824632" y="672772"/>
             <a:ext cx="442120" cy="980984"/>
           </a:xfrm>
           <a:prstGeom prst="rightArrow">
@@ -3995,7 +3993,7 @@
         </p:nvSpPr>
         <p:spPr>
           <a:xfrm>
-            <a:off x="4474345" y="501928"/>
+            <a:off x="4429956" y="34680"/>
             <a:ext cx="3231472" cy="776457"/>
           </a:xfrm>
           <a:prstGeom prst="roundRect">
@@ -4047,7 +4045,7 @@
         </p:nvSpPr>
         <p:spPr>
           <a:xfrm>
-            <a:off x="5046953" y="1941228"/>
+            <a:off x="5046953" y="1444937"/>
             <a:ext cx="1997478" cy="369332"/>
           </a:xfrm>
           <a:prstGeom prst="rect">
@@ -4078,15 +4076,7 @@
             <a:pPr algn="ctr"/>
             <a:r>
               <a:rPr lang="en-US" dirty="0"/>
-              <a:t>Blender (2</a:t>
-            </a:r>
-            <a:r>
-              <a:rPr lang="en-US" baseline="30000" dirty="0"/>
-              <a:t>nd</a:t>
-            </a:r>
-            <a:r>
-              <a:rPr lang="en-US" dirty="0"/>
-              <a:t> Layer)</a:t>
+              <a:t>Blender</a:t>
             </a:r>
           </a:p>
         </p:txBody>
@@ -4105,7 +4095,7 @@
         </p:nvSpPr>
         <p:spPr>
           <a:xfrm>
-            <a:off x="2237174" y="2420910"/>
+            <a:off x="2237174" y="1924619"/>
             <a:ext cx="1429305" cy="584775"/>
           </a:xfrm>
           <a:prstGeom prst="rect">
@@ -4154,7 +4144,7 @@
         </p:nvSpPr>
         <p:spPr>
           <a:xfrm>
-            <a:off x="4341920" y="2426516"/>
+            <a:off x="4341920" y="1930225"/>
             <a:ext cx="3220375" cy="584775"/>
           </a:xfrm>
           <a:prstGeom prst="rect">
@@ -4203,7 +4193,7 @@
         </p:nvSpPr>
         <p:spPr>
           <a:xfrm>
-            <a:off x="8049086" y="2420910"/>
+            <a:off x="8049086" y="1924619"/>
             <a:ext cx="3220375" cy="584775"/>
           </a:xfrm>
           <a:prstGeom prst="rect">
@@ -4234,6 +4224,541 @@
             <a:r>
               <a:rPr lang="en-US" sz="3200" dirty="0"/>
               <a:t>Neural Network</a:t>
+            </a:r>
+          </a:p>
+        </p:txBody>
+      </p:sp>
+      <p:sp>
+        <p:nvSpPr>
+          <p:cNvPr id="24" name="Rectangle: Rounded Corners 23">
+            <a:extLst>
+              <a:ext uri="{FF2B5EF4-FFF2-40B4-BE49-F238E27FC236}">
+                <a16:creationId xmlns:a16="http://schemas.microsoft.com/office/drawing/2014/main" id="{17881AE8-BCDF-4D13-9F9F-1D9BE4B8B918}"/>
+              </a:ext>
+            </a:extLst>
+          </p:cNvPr>
+          <p:cNvSpPr/>
+          <p:nvPr/>
+        </p:nvSpPr>
+        <p:spPr>
+          <a:xfrm>
+            <a:off x="727968" y="4004243"/>
+            <a:ext cx="10635449" cy="1083074"/>
+          </a:xfrm>
+          <a:prstGeom prst="roundRect">
+            <a:avLst/>
+          </a:prstGeom>
+          <a:noFill/>
+          <a:ln w="9525" cap="flat" cmpd="sng" algn="ctr">
+            <a:solidFill>
+              <a:schemeClr val="dk1"/>
+            </a:solidFill>
+            <a:prstDash val="solid"/>
+            <a:round/>
+            <a:headEnd type="none" w="med" len="med"/>
+            <a:tailEnd type="none" w="med" len="med"/>
+          </a:ln>
+        </p:spPr>
+        <p:style>
+          <a:lnRef idx="0">
+            <a:scrgbClr r="0" g="0" b="0"/>
+          </a:lnRef>
+          <a:fillRef idx="0">
+            <a:scrgbClr r="0" g="0" b="0"/>
+          </a:fillRef>
+          <a:effectRef idx="0">
+            <a:scrgbClr r="0" g="0" b="0"/>
+          </a:effectRef>
+          <a:fontRef idx="minor">
+            <a:schemeClr val="dk1"/>
+          </a:fontRef>
+        </p:style>
+        <p:txBody>
+          <a:bodyPr rtlCol="0" anchor="ctr"/>
+          <a:lstStyle/>
+          <a:p>
+            <a:pPr algn="ctr"/>
+            <a:endParaRPr lang="en-US"/>
+          </a:p>
+        </p:txBody>
+      </p:sp>
+      <p:sp>
+        <p:nvSpPr>
+          <p:cNvPr id="25" name="TextBox 24">
+            <a:extLst>
+              <a:ext uri="{FF2B5EF4-FFF2-40B4-BE49-F238E27FC236}">
+                <a16:creationId xmlns:a16="http://schemas.microsoft.com/office/drawing/2014/main" id="{6B6BED32-BFB1-4B55-B183-AB0C770D2249}"/>
+              </a:ext>
+            </a:extLst>
+          </p:cNvPr>
+          <p:cNvSpPr txBox="1"/>
+          <p:nvPr/>
+        </p:nvSpPr>
+        <p:spPr>
+          <a:xfrm>
+            <a:off x="5091342" y="3844604"/>
+            <a:ext cx="1997478" cy="369332"/>
+          </a:xfrm>
+          <a:prstGeom prst="rect">
+            <a:avLst/>
+          </a:prstGeom>
+          <a:ln w="28575"/>
+        </p:spPr>
+        <p:style>
+          <a:lnRef idx="2">
+            <a:schemeClr val="accent5"/>
+          </a:lnRef>
+          <a:fillRef idx="1">
+            <a:schemeClr val="lt1"/>
+          </a:fillRef>
+          <a:effectRef idx="0">
+            <a:schemeClr val="accent5"/>
+          </a:effectRef>
+          <a:fontRef idx="minor">
+            <a:schemeClr val="dk1"/>
+          </a:fontRef>
+        </p:style>
+        <p:txBody>
+          <a:bodyPr wrap="square" rtlCol="0">
+            <a:spAutoFit/>
+          </a:bodyPr>
+          <a:lstStyle/>
+          <a:p>
+            <a:pPr algn="ctr"/>
+            <a:r>
+              <a:rPr lang="en-US" dirty="0" err="1"/>
+              <a:t>GridSearchCV</a:t>
+            </a:r>
+            <a:endParaRPr lang="en-US" dirty="0"/>
+          </a:p>
+        </p:txBody>
+      </p:sp>
+      <p:sp>
+        <p:nvSpPr>
+          <p:cNvPr id="26" name="TextBox 25">
+            <a:extLst>
+              <a:ext uri="{FF2B5EF4-FFF2-40B4-BE49-F238E27FC236}">
+                <a16:creationId xmlns:a16="http://schemas.microsoft.com/office/drawing/2014/main" id="{9ABB3D50-B845-476C-B129-D3E146FA6E63}"/>
+              </a:ext>
+            </a:extLst>
+          </p:cNvPr>
+          <p:cNvSpPr txBox="1"/>
+          <p:nvPr/>
+        </p:nvSpPr>
+        <p:spPr>
+          <a:xfrm>
+            <a:off x="986900" y="4300095"/>
+            <a:ext cx="1429305" cy="400110"/>
+          </a:xfrm>
+          <a:prstGeom prst="rect">
+            <a:avLst/>
+          </a:prstGeom>
+        </p:spPr>
+        <p:style>
+          <a:lnRef idx="3">
+            <a:schemeClr val="lt1"/>
+          </a:lnRef>
+          <a:fillRef idx="1">
+            <a:schemeClr val="accent5"/>
+          </a:fillRef>
+          <a:effectRef idx="1">
+            <a:schemeClr val="accent5"/>
+          </a:effectRef>
+          <a:fontRef idx="minor">
+            <a:schemeClr val="lt1"/>
+          </a:fontRef>
+        </p:style>
+        <p:txBody>
+          <a:bodyPr wrap="square" rtlCol="0">
+            <a:spAutoFit/>
+          </a:bodyPr>
+          <a:lstStyle/>
+          <a:p>
+            <a:pPr algn="ctr"/>
+            <a:r>
+              <a:rPr lang="en-US" sz="2000" dirty="0"/>
+              <a:t>Ridge</a:t>
+            </a:r>
+            <a:endParaRPr lang="en-US" sz="3200" dirty="0"/>
+          </a:p>
+        </p:txBody>
+      </p:sp>
+      <p:sp>
+        <p:nvSpPr>
+          <p:cNvPr id="27" name="TextBox 26">
+            <a:extLst>
+              <a:ext uri="{FF2B5EF4-FFF2-40B4-BE49-F238E27FC236}">
+                <a16:creationId xmlns:a16="http://schemas.microsoft.com/office/drawing/2014/main" id="{451EB1E2-63AA-4E1C-880B-00A43F93ACD0}"/>
+              </a:ext>
+            </a:extLst>
+          </p:cNvPr>
+          <p:cNvSpPr txBox="1"/>
+          <p:nvPr/>
+        </p:nvSpPr>
+        <p:spPr>
+          <a:xfrm>
+            <a:off x="2496105" y="4300094"/>
+            <a:ext cx="1518079" cy="707886"/>
+          </a:xfrm>
+          <a:prstGeom prst="rect">
+            <a:avLst/>
+          </a:prstGeom>
+        </p:spPr>
+        <p:style>
+          <a:lnRef idx="3">
+            <a:schemeClr val="lt1"/>
+          </a:lnRef>
+          <a:fillRef idx="1">
+            <a:schemeClr val="accent5"/>
+          </a:fillRef>
+          <a:effectRef idx="1">
+            <a:schemeClr val="accent5"/>
+          </a:effectRef>
+          <a:fontRef idx="minor">
+            <a:schemeClr val="lt1"/>
+          </a:fontRef>
+        </p:style>
+        <p:txBody>
+          <a:bodyPr wrap="square" rtlCol="0">
+            <a:spAutoFit/>
+          </a:bodyPr>
+          <a:lstStyle/>
+          <a:p>
+            <a:pPr algn="ctr"/>
+            <a:r>
+              <a:rPr lang="en-US" sz="2000" dirty="0"/>
+              <a:t>Elastic </a:t>
+            </a:r>
+          </a:p>
+          <a:p>
+            <a:pPr algn="ctr"/>
+            <a:r>
+              <a:rPr lang="en-US" sz="2000" dirty="0"/>
+              <a:t>Net</a:t>
+            </a:r>
+          </a:p>
+        </p:txBody>
+      </p:sp>
+      <p:sp>
+        <p:nvSpPr>
+          <p:cNvPr id="28" name="TextBox 27">
+            <a:extLst>
+              <a:ext uri="{FF2B5EF4-FFF2-40B4-BE49-F238E27FC236}">
+                <a16:creationId xmlns:a16="http://schemas.microsoft.com/office/drawing/2014/main" id="{EB6D925A-3E60-491C-ACCC-D58B675DC5B7}"/>
+              </a:ext>
+            </a:extLst>
+          </p:cNvPr>
+          <p:cNvSpPr txBox="1"/>
+          <p:nvPr/>
+        </p:nvSpPr>
+        <p:spPr>
+          <a:xfrm>
+            <a:off x="4094084" y="4300094"/>
+            <a:ext cx="1757038" cy="707886"/>
+          </a:xfrm>
+          <a:prstGeom prst="rect">
+            <a:avLst/>
+          </a:prstGeom>
+        </p:spPr>
+        <p:style>
+          <a:lnRef idx="3">
+            <a:schemeClr val="lt1"/>
+          </a:lnRef>
+          <a:fillRef idx="1">
+            <a:schemeClr val="accent5"/>
+          </a:fillRef>
+          <a:effectRef idx="1">
+            <a:schemeClr val="accent5"/>
+          </a:effectRef>
+          <a:fontRef idx="minor">
+            <a:schemeClr val="lt1"/>
+          </a:fontRef>
+        </p:style>
+        <p:txBody>
+          <a:bodyPr wrap="square" rtlCol="0">
+            <a:spAutoFit/>
+          </a:bodyPr>
+          <a:lstStyle/>
+          <a:p>
+            <a:pPr algn="ctr"/>
+            <a:r>
+              <a:rPr lang="en-US" sz="2000" dirty="0"/>
+              <a:t>Random</a:t>
+            </a:r>
+          </a:p>
+          <a:p>
+            <a:pPr algn="ctr"/>
+            <a:r>
+              <a:rPr lang="en-US" sz="2000" dirty="0"/>
+              <a:t>Forest</a:t>
+            </a:r>
+          </a:p>
+        </p:txBody>
+      </p:sp>
+      <p:sp>
+        <p:nvSpPr>
+          <p:cNvPr id="29" name="TextBox 28">
+            <a:extLst>
+              <a:ext uri="{FF2B5EF4-FFF2-40B4-BE49-F238E27FC236}">
+                <a16:creationId xmlns:a16="http://schemas.microsoft.com/office/drawing/2014/main" id="{1CAC2CAE-1E1B-470B-A443-640628DDEB9D}"/>
+              </a:ext>
+            </a:extLst>
+          </p:cNvPr>
+          <p:cNvSpPr txBox="1"/>
+          <p:nvPr/>
+        </p:nvSpPr>
+        <p:spPr>
+          <a:xfrm>
+            <a:off x="5931022" y="4287350"/>
+            <a:ext cx="1694895" cy="707886"/>
+          </a:xfrm>
+          <a:prstGeom prst="rect">
+            <a:avLst/>
+          </a:prstGeom>
+        </p:spPr>
+        <p:style>
+          <a:lnRef idx="3">
+            <a:schemeClr val="lt1"/>
+          </a:lnRef>
+          <a:fillRef idx="1">
+            <a:schemeClr val="accent5"/>
+          </a:fillRef>
+          <a:effectRef idx="1">
+            <a:schemeClr val="accent5"/>
+          </a:effectRef>
+          <a:fontRef idx="minor">
+            <a:schemeClr val="lt1"/>
+          </a:fontRef>
+        </p:style>
+        <p:txBody>
+          <a:bodyPr wrap="square" rtlCol="0">
+            <a:spAutoFit/>
+          </a:bodyPr>
+          <a:lstStyle/>
+          <a:p>
+            <a:pPr algn="ctr"/>
+            <a:r>
+              <a:rPr lang="en-US" sz="2000" dirty="0"/>
+              <a:t>Extra </a:t>
+            </a:r>
+          </a:p>
+          <a:p>
+            <a:pPr algn="ctr"/>
+            <a:r>
+              <a:rPr lang="en-US" sz="2000" dirty="0"/>
+              <a:t>Tree</a:t>
+            </a:r>
+          </a:p>
+        </p:txBody>
+      </p:sp>
+      <p:sp>
+        <p:nvSpPr>
+          <p:cNvPr id="30" name="TextBox 29">
+            <a:extLst>
+              <a:ext uri="{FF2B5EF4-FFF2-40B4-BE49-F238E27FC236}">
+                <a16:creationId xmlns:a16="http://schemas.microsoft.com/office/drawing/2014/main" id="{F5C28817-5C48-4180-816F-F271EED94ED3}"/>
+              </a:ext>
+            </a:extLst>
+          </p:cNvPr>
+          <p:cNvSpPr txBox="1"/>
+          <p:nvPr/>
+        </p:nvSpPr>
+        <p:spPr>
+          <a:xfrm>
+            <a:off x="7705817" y="4287350"/>
+            <a:ext cx="1694895" cy="707886"/>
+          </a:xfrm>
+          <a:prstGeom prst="rect">
+            <a:avLst/>
+          </a:prstGeom>
+        </p:spPr>
+        <p:style>
+          <a:lnRef idx="3">
+            <a:schemeClr val="lt1"/>
+          </a:lnRef>
+          <a:fillRef idx="1">
+            <a:schemeClr val="accent5"/>
+          </a:fillRef>
+          <a:effectRef idx="1">
+            <a:schemeClr val="accent5"/>
+          </a:effectRef>
+          <a:fontRef idx="minor">
+            <a:schemeClr val="lt1"/>
+          </a:fontRef>
+        </p:style>
+        <p:txBody>
+          <a:bodyPr wrap="square" rtlCol="0">
+            <a:spAutoFit/>
+          </a:bodyPr>
+          <a:lstStyle/>
+          <a:p>
+            <a:pPr algn="ctr"/>
+            <a:r>
+              <a:rPr lang="en-US" sz="2000" dirty="0"/>
+              <a:t>Gradient Boosting</a:t>
+            </a:r>
+          </a:p>
+        </p:txBody>
+      </p:sp>
+      <p:sp>
+        <p:nvSpPr>
+          <p:cNvPr id="31" name="TextBox 30">
+            <a:extLst>
+              <a:ext uri="{FF2B5EF4-FFF2-40B4-BE49-F238E27FC236}">
+                <a16:creationId xmlns:a16="http://schemas.microsoft.com/office/drawing/2014/main" id="{D8CACA8C-7478-4690-BBA8-F4F7714A271C}"/>
+              </a:ext>
+            </a:extLst>
+          </p:cNvPr>
+          <p:cNvSpPr txBox="1"/>
+          <p:nvPr/>
+        </p:nvSpPr>
+        <p:spPr>
+          <a:xfrm>
+            <a:off x="9416990" y="4287350"/>
+            <a:ext cx="1694895" cy="707886"/>
+          </a:xfrm>
+          <a:prstGeom prst="rect">
+            <a:avLst/>
+          </a:prstGeom>
+        </p:spPr>
+        <p:style>
+          <a:lnRef idx="3">
+            <a:schemeClr val="lt1"/>
+          </a:lnRef>
+          <a:fillRef idx="1">
+            <a:schemeClr val="accent5"/>
+          </a:fillRef>
+          <a:effectRef idx="1">
+            <a:schemeClr val="accent5"/>
+          </a:effectRef>
+          <a:fontRef idx="minor">
+            <a:schemeClr val="lt1"/>
+          </a:fontRef>
+        </p:style>
+        <p:txBody>
+          <a:bodyPr wrap="square" rtlCol="0">
+            <a:spAutoFit/>
+          </a:bodyPr>
+          <a:lstStyle/>
+          <a:p>
+            <a:pPr algn="ctr"/>
+            <a:r>
+              <a:rPr lang="en-US" sz="2000" dirty="0"/>
+              <a:t>Neural Network</a:t>
+            </a:r>
+          </a:p>
+        </p:txBody>
+      </p:sp>
+      <p:sp>
+        <p:nvSpPr>
+          <p:cNvPr id="2" name="TextBox 1">
+            <a:extLst>
+              <a:ext uri="{FF2B5EF4-FFF2-40B4-BE49-F238E27FC236}">
+                <a16:creationId xmlns:a16="http://schemas.microsoft.com/office/drawing/2014/main" id="{2B621EFB-57AD-4582-BB06-210E61906415}"/>
+              </a:ext>
+            </a:extLst>
+          </p:cNvPr>
+          <p:cNvSpPr txBox="1"/>
+          <p:nvPr/>
+        </p:nvSpPr>
+        <p:spPr>
+          <a:xfrm rot="10800000">
+            <a:off x="186403" y="4004243"/>
+            <a:ext cx="461665" cy="1083074"/>
+          </a:xfrm>
+          <a:prstGeom prst="rect">
+            <a:avLst/>
+          </a:prstGeom>
+        </p:spPr>
+        <p:style>
+          <a:lnRef idx="2">
+            <a:schemeClr val="accent1"/>
+          </a:lnRef>
+          <a:fillRef idx="1">
+            <a:schemeClr val="lt1"/>
+          </a:fillRef>
+          <a:effectRef idx="0">
+            <a:schemeClr val="accent1"/>
+          </a:effectRef>
+          <a:fontRef idx="minor">
+            <a:schemeClr val="dk1"/>
+          </a:fontRef>
+        </p:style>
+        <p:txBody>
+          <a:bodyPr vert="eaVert" wrap="square" rtlCol="0">
+            <a:spAutoFit/>
+          </a:bodyPr>
+          <a:lstStyle/>
+          <a:p>
+            <a:pPr algn="ctr"/>
+            <a:r>
+              <a:rPr lang="en-US" dirty="0"/>
+              <a:t>2</a:t>
+            </a:r>
+            <a:r>
+              <a:rPr lang="en-US" baseline="30000" dirty="0"/>
+              <a:t>nd</a:t>
+            </a:r>
+            <a:r>
+              <a:rPr lang="en-US" dirty="0"/>
+              <a:t> Layer</a:t>
+            </a:r>
+          </a:p>
+        </p:txBody>
+      </p:sp>
+      <p:sp>
+        <p:nvSpPr>
+          <p:cNvPr id="32" name="TextBox 31">
+            <a:extLst>
+              <a:ext uri="{FF2B5EF4-FFF2-40B4-BE49-F238E27FC236}">
+                <a16:creationId xmlns:a16="http://schemas.microsoft.com/office/drawing/2014/main" id="{7181ABE1-F4C0-43B2-85E1-8EA11EC93126}"/>
+              </a:ext>
+            </a:extLst>
+          </p:cNvPr>
+          <p:cNvSpPr txBox="1"/>
+          <p:nvPr/>
+        </p:nvSpPr>
+        <p:spPr>
+          <a:xfrm rot="10800000">
+            <a:off x="186403" y="5468645"/>
+            <a:ext cx="461665" cy="1083074"/>
+          </a:xfrm>
+          <a:prstGeom prst="rect">
+            <a:avLst/>
+          </a:prstGeom>
+        </p:spPr>
+        <p:style>
+          <a:lnRef idx="2">
+            <a:schemeClr val="accent1"/>
+          </a:lnRef>
+          <a:fillRef idx="1">
+            <a:schemeClr val="lt1"/>
+          </a:fillRef>
+          <a:effectRef idx="0">
+            <a:schemeClr val="accent1"/>
+          </a:effectRef>
+          <a:fontRef idx="minor">
+            <a:schemeClr val="dk1"/>
+          </a:fontRef>
+        </p:style>
+        <p:txBody>
+          <a:bodyPr vert="eaVert" wrap="square" rtlCol="0">
+            <a:spAutoFit/>
+          </a:bodyPr>
+          <a:lstStyle/>
+          <a:p>
+            <a:pPr algn="ctr"/>
+            <a:r>
+              <a:rPr lang="en-US" dirty="0"/>
+              <a:t>1</a:t>
+            </a:r>
+            <a:r>
+              <a:rPr lang="en-US" baseline="30000" dirty="0"/>
+              <a:t>st</a:t>
+            </a:r>
+            <a:r>
+              <a:rPr lang="en-US" dirty="0"/>
+              <a:t> Layer</a:t>
             </a:r>
           </a:p>
         </p:txBody>

</xml_diff>

<commit_message>
Log update & Stacking Figure update
</commit_message>
<xml_diff>
--- a/documents/stacking_layer.pptx
+++ b/documents/stacking_layer.pptx
@@ -104,6 +104,11 @@
       </a:defRPr>
     </a:lvl9pPr>
   </p:defaultTextStyle>
+  <p:extLst>
+    <p:ext uri="{EFAFB233-063F-42B5-8137-9DF3F51BA10A}">
+      <p15:sldGuideLst xmlns:p15="http://schemas.microsoft.com/office/powerpoint/2012/main"/>
+    </p:ext>
+  </p:extLst>
 </p:presentation>
 </file>
 
@@ -258,7 +263,7 @@
           <a:p>
             <a:fld id="{58BFABE9-116B-4421-B689-A4EA4F7DEA38}" type="datetimeFigureOut">
               <a:rPr lang="en-US" smtClean="0"/>
-              <a:t>8/8/2017</a:t>
+              <a:t>8/11/2017</a:t>
             </a:fld>
             <a:endParaRPr lang="en-US"/>
           </a:p>
@@ -456,7 +461,7 @@
           <a:p>
             <a:fld id="{58BFABE9-116B-4421-B689-A4EA4F7DEA38}" type="datetimeFigureOut">
               <a:rPr lang="en-US" smtClean="0"/>
-              <a:t>8/8/2017</a:t>
+              <a:t>8/11/2017</a:t>
             </a:fld>
             <a:endParaRPr lang="en-US"/>
           </a:p>
@@ -664,7 +669,7 @@
           <a:p>
             <a:fld id="{58BFABE9-116B-4421-B689-A4EA4F7DEA38}" type="datetimeFigureOut">
               <a:rPr lang="en-US" smtClean="0"/>
-              <a:t>8/8/2017</a:t>
+              <a:t>8/11/2017</a:t>
             </a:fld>
             <a:endParaRPr lang="en-US"/>
           </a:p>
@@ -862,7 +867,7 @@
           <a:p>
             <a:fld id="{58BFABE9-116B-4421-B689-A4EA4F7DEA38}" type="datetimeFigureOut">
               <a:rPr lang="en-US" smtClean="0"/>
-              <a:t>8/8/2017</a:t>
+              <a:t>8/11/2017</a:t>
             </a:fld>
             <a:endParaRPr lang="en-US"/>
           </a:p>
@@ -1137,7 +1142,7 @@
           <a:p>
             <a:fld id="{58BFABE9-116B-4421-B689-A4EA4F7DEA38}" type="datetimeFigureOut">
               <a:rPr lang="en-US" smtClean="0"/>
-              <a:t>8/8/2017</a:t>
+              <a:t>8/11/2017</a:t>
             </a:fld>
             <a:endParaRPr lang="en-US"/>
           </a:p>
@@ -1402,7 +1407,7 @@
           <a:p>
             <a:fld id="{58BFABE9-116B-4421-B689-A4EA4F7DEA38}" type="datetimeFigureOut">
               <a:rPr lang="en-US" smtClean="0"/>
-              <a:t>8/8/2017</a:t>
+              <a:t>8/11/2017</a:t>
             </a:fld>
             <a:endParaRPr lang="en-US"/>
           </a:p>
@@ -1814,7 +1819,7 @@
           <a:p>
             <a:fld id="{58BFABE9-116B-4421-B689-A4EA4F7DEA38}" type="datetimeFigureOut">
               <a:rPr lang="en-US" smtClean="0"/>
-              <a:t>8/8/2017</a:t>
+              <a:t>8/11/2017</a:t>
             </a:fld>
             <a:endParaRPr lang="en-US"/>
           </a:p>
@@ -1955,7 +1960,7 @@
           <a:p>
             <a:fld id="{58BFABE9-116B-4421-B689-A4EA4F7DEA38}" type="datetimeFigureOut">
               <a:rPr lang="en-US" smtClean="0"/>
-              <a:t>8/8/2017</a:t>
+              <a:t>8/11/2017</a:t>
             </a:fld>
             <a:endParaRPr lang="en-US"/>
           </a:p>
@@ -2068,7 +2073,7 @@
           <a:p>
             <a:fld id="{58BFABE9-116B-4421-B689-A4EA4F7DEA38}" type="datetimeFigureOut">
               <a:rPr lang="en-US" smtClean="0"/>
-              <a:t>8/8/2017</a:t>
+              <a:t>8/11/2017</a:t>
             </a:fld>
             <a:endParaRPr lang="en-US"/>
           </a:p>
@@ -2379,7 +2384,7 @@
           <a:p>
             <a:fld id="{58BFABE9-116B-4421-B689-A4EA4F7DEA38}" type="datetimeFigureOut">
               <a:rPr lang="en-US" smtClean="0"/>
-              <a:t>8/8/2017</a:t>
+              <a:t>8/11/2017</a:t>
             </a:fld>
             <a:endParaRPr lang="en-US"/>
           </a:p>
@@ -2667,7 +2672,7 @@
           <a:p>
             <a:fld id="{58BFABE9-116B-4421-B689-A4EA4F7DEA38}" type="datetimeFigureOut">
               <a:rPr lang="en-US" smtClean="0"/>
-              <a:t>8/8/2017</a:t>
+              <a:t>8/11/2017</a:t>
             </a:fld>
             <a:endParaRPr lang="en-US"/>
           </a:p>
@@ -2908,7 +2913,7 @@
           <a:p>
             <a:fld id="{58BFABE9-116B-4421-B689-A4EA4F7DEA38}" type="datetimeFigureOut">
               <a:rPr lang="en-US" smtClean="0"/>
-              <a:t>8/8/2017</a:t>
+              <a:t>8/11/2017</a:t>
             </a:fld>
             <a:endParaRPr lang="en-US"/>
           </a:p>
@@ -3339,8 +3344,8 @@
         </p:nvSpPr>
         <p:spPr>
           <a:xfrm>
-            <a:off x="426128" y="3799643"/>
-            <a:ext cx="11327907" cy="2982897"/>
+            <a:off x="381738" y="3369762"/>
+            <a:ext cx="11327907" cy="3435109"/>
           </a:xfrm>
           <a:prstGeom prst="roundRect">
             <a:avLst/>
@@ -3366,7 +3371,7 @@
           <a:lstStyle/>
           <a:p>
             <a:pPr algn="ctr"/>
-            <a:endParaRPr lang="en-US"/>
+            <a:endParaRPr lang="en-US" dirty="0"/>
           </a:p>
         </p:txBody>
       </p:sp>
@@ -3384,8 +3389,8 @@
         </p:nvSpPr>
         <p:spPr>
           <a:xfrm>
-            <a:off x="727968" y="4287914"/>
-            <a:ext cx="10635449" cy="2263805"/>
+            <a:off x="727968" y="5468645"/>
+            <a:ext cx="10635449" cy="1083074"/>
           </a:xfrm>
           <a:prstGeom prst="roundRect">
             <a:avLst/>
@@ -3438,7 +3443,7 @@
         </p:nvSpPr>
         <p:spPr>
           <a:xfrm>
-            <a:off x="5046953" y="4103248"/>
+            <a:off x="5091342" y="5309006"/>
             <a:ext cx="1997478" cy="369332"/>
           </a:xfrm>
           <a:prstGeom prst="rect">
@@ -3489,8 +3494,8 @@
         </p:nvSpPr>
         <p:spPr>
           <a:xfrm>
-            <a:off x="923278" y="5145183"/>
-            <a:ext cx="1429305" cy="584775"/>
+            <a:off x="986900" y="5764497"/>
+            <a:ext cx="1429305" cy="400110"/>
           </a:xfrm>
           <a:prstGeom prst="rect">
             <a:avLst/>
@@ -3518,9 +3523,10 @@
           <a:p>
             <a:pPr algn="ctr"/>
             <a:r>
-              <a:rPr lang="en-US" sz="3200" dirty="0"/>
+              <a:rPr lang="en-US" sz="2000" dirty="0"/>
               <a:t>Ridge</a:t>
             </a:r>
+            <a:endParaRPr lang="en-US" sz="3200" dirty="0"/>
           </a:p>
         </p:txBody>
       </p:sp>
@@ -3538,8 +3544,8 @@
         </p:nvSpPr>
         <p:spPr>
           <a:xfrm>
-            <a:off x="2432483" y="5145182"/>
-            <a:ext cx="1518079" cy="1077218"/>
+            <a:off x="2496105" y="5764496"/>
+            <a:ext cx="1518079" cy="707886"/>
           </a:xfrm>
           <a:prstGeom prst="rect">
             <a:avLst/>
@@ -3567,14 +3573,14 @@
           <a:p>
             <a:pPr algn="ctr"/>
             <a:r>
-              <a:rPr lang="en-US" sz="3200" dirty="0"/>
+              <a:rPr lang="en-US" sz="2000" dirty="0"/>
               <a:t>Elastic </a:t>
             </a:r>
           </a:p>
           <a:p>
             <a:pPr algn="ctr"/>
             <a:r>
-              <a:rPr lang="en-US" sz="3200" dirty="0"/>
+              <a:rPr lang="en-US" sz="2000" dirty="0"/>
               <a:t>Net</a:t>
             </a:r>
           </a:p>
@@ -3594,8 +3600,8 @@
         </p:nvSpPr>
         <p:spPr>
           <a:xfrm>
-            <a:off x="4030462" y="5145182"/>
-            <a:ext cx="1757038" cy="1077218"/>
+            <a:off x="4094084" y="5764496"/>
+            <a:ext cx="1757038" cy="707886"/>
           </a:xfrm>
           <a:prstGeom prst="rect">
             <a:avLst/>
@@ -3623,14 +3629,14 @@
           <a:p>
             <a:pPr algn="ctr"/>
             <a:r>
-              <a:rPr lang="en-US" sz="3200" dirty="0"/>
+              <a:rPr lang="en-US" sz="2000" dirty="0"/>
               <a:t>Random</a:t>
             </a:r>
           </a:p>
           <a:p>
             <a:pPr algn="ctr"/>
             <a:r>
-              <a:rPr lang="en-US" sz="3200" dirty="0"/>
+              <a:rPr lang="en-US" sz="2000" dirty="0"/>
               <a:t>Forest</a:t>
             </a:r>
           </a:p>
@@ -3650,8 +3656,8 @@
         </p:nvSpPr>
         <p:spPr>
           <a:xfrm>
-            <a:off x="5867400" y="5132438"/>
-            <a:ext cx="1694895" cy="1077218"/>
+            <a:off x="5931022" y="5751752"/>
+            <a:ext cx="1694895" cy="707886"/>
           </a:xfrm>
           <a:prstGeom prst="rect">
             <a:avLst/>
@@ -3679,14 +3685,14 @@
           <a:p>
             <a:pPr algn="ctr"/>
             <a:r>
-              <a:rPr lang="en-US" sz="3200" dirty="0"/>
+              <a:rPr lang="en-US" sz="2000" dirty="0"/>
               <a:t>Extra </a:t>
             </a:r>
           </a:p>
           <a:p>
             <a:pPr algn="ctr"/>
             <a:r>
-              <a:rPr lang="en-US" sz="3200" dirty="0"/>
+              <a:rPr lang="en-US" sz="2000" dirty="0"/>
               <a:t>Tree</a:t>
             </a:r>
           </a:p>
@@ -3706,8 +3712,8 @@
         </p:nvSpPr>
         <p:spPr>
           <a:xfrm>
-            <a:off x="7642195" y="5132438"/>
-            <a:ext cx="1694895" cy="1077218"/>
+            <a:off x="7705817" y="5751752"/>
+            <a:ext cx="1694895" cy="707886"/>
           </a:xfrm>
           <a:prstGeom prst="rect">
             <a:avLst/>
@@ -3735,7 +3741,7 @@
           <a:p>
             <a:pPr algn="ctr"/>
             <a:r>
-              <a:rPr lang="en-US" sz="3200" dirty="0"/>
+              <a:rPr lang="en-US" sz="2000" dirty="0"/>
               <a:t>Gradient Boosting</a:t>
             </a:r>
           </a:p>
@@ -3755,8 +3761,8 @@
         </p:nvSpPr>
         <p:spPr>
           <a:xfrm>
-            <a:off x="9416990" y="5132438"/>
-            <a:ext cx="1694895" cy="1077218"/>
+            <a:off x="9416990" y="5751752"/>
+            <a:ext cx="1694895" cy="707886"/>
           </a:xfrm>
           <a:prstGeom prst="rect">
             <a:avLst/>
@@ -3784,7 +3790,7 @@
           <a:p>
             <a:pPr algn="ctr"/>
             <a:r>
-              <a:rPr lang="en-US" sz="3200" dirty="0"/>
+              <a:rPr lang="en-US" sz="2000" dirty="0"/>
               <a:t>Neural Network</a:t>
             </a:r>
           </a:p>
@@ -3804,7 +3810,7 @@
         </p:nvSpPr>
         <p:spPr>
           <a:xfrm>
-            <a:off x="5046953" y="3614977"/>
+            <a:off x="5091342" y="3177007"/>
             <a:ext cx="1997478" cy="369332"/>
           </a:xfrm>
           <a:prstGeom prst="rect">
@@ -3835,15 +3841,7 @@
             <a:pPr algn="ctr"/>
             <a:r>
               <a:rPr lang="en-US" dirty="0"/>
-              <a:t>1</a:t>
-            </a:r>
-            <a:r>
-              <a:rPr lang="en-US" baseline="30000" dirty="0"/>
-              <a:t>st</a:t>
-            </a:r>
-            <a:r>
-              <a:rPr lang="en-US" dirty="0"/>
-              <a:t> Layer</a:t>
+              <a:t> Stacking Layer</a:t>
             </a:r>
           </a:p>
         </p:txBody>
@@ -3862,7 +3860,7 @@
         </p:nvSpPr>
         <p:spPr>
           <a:xfrm rot="16200000">
-            <a:off x="5824632" y="2857270"/>
+            <a:off x="5824632" y="2389361"/>
             <a:ext cx="442120" cy="980984"/>
           </a:xfrm>
           <a:prstGeom prst="rightArrow">
@@ -3906,7 +3904,7 @@
         </p:nvSpPr>
         <p:spPr>
           <a:xfrm>
-            <a:off x="426128" y="2024109"/>
+            <a:off x="426128" y="1527818"/>
             <a:ext cx="11327907" cy="1102932"/>
           </a:xfrm>
           <a:prstGeom prst="roundRect">
@@ -3951,7 +3949,7 @@
         </p:nvSpPr>
         <p:spPr>
           <a:xfrm rot="16200000">
-            <a:off x="5824632" y="1081736"/>
+            <a:off x="5824632" y="672772"/>
             <a:ext cx="442120" cy="980984"/>
           </a:xfrm>
           <a:prstGeom prst="rightArrow">
@@ -3995,7 +3993,7 @@
         </p:nvSpPr>
         <p:spPr>
           <a:xfrm>
-            <a:off x="4474345" y="501928"/>
+            <a:off x="4429956" y="34680"/>
             <a:ext cx="3231472" cy="776457"/>
           </a:xfrm>
           <a:prstGeom prst="roundRect">
@@ -4047,7 +4045,7 @@
         </p:nvSpPr>
         <p:spPr>
           <a:xfrm>
-            <a:off x="5046953" y="1941228"/>
+            <a:off x="5046953" y="1444937"/>
             <a:ext cx="1997478" cy="369332"/>
           </a:xfrm>
           <a:prstGeom prst="rect">
@@ -4105,7 +4103,7 @@
         </p:nvSpPr>
         <p:spPr>
           <a:xfrm>
-            <a:off x="2237174" y="2420910"/>
+            <a:off x="2237174" y="1924619"/>
             <a:ext cx="1429305" cy="584775"/>
           </a:xfrm>
           <a:prstGeom prst="rect">
@@ -4154,7 +4152,7 @@
         </p:nvSpPr>
         <p:spPr>
           <a:xfrm>
-            <a:off x="4341920" y="2426516"/>
+            <a:off x="4341920" y="1930225"/>
             <a:ext cx="3220375" cy="584775"/>
           </a:xfrm>
           <a:prstGeom prst="rect">
@@ -4203,7 +4201,7 @@
         </p:nvSpPr>
         <p:spPr>
           <a:xfrm>
-            <a:off x="8049086" y="2420910"/>
+            <a:off x="8049086" y="1924619"/>
             <a:ext cx="3220375" cy="584775"/>
           </a:xfrm>
           <a:prstGeom prst="rect">
@@ -4233,6 +4231,427 @@
             <a:pPr algn="ctr"/>
             <a:r>
               <a:rPr lang="en-US" sz="3200" dirty="0"/>
+              <a:t>Neural Network</a:t>
+            </a:r>
+          </a:p>
+        </p:txBody>
+      </p:sp>
+      <p:sp>
+        <p:nvSpPr>
+          <p:cNvPr id="24" name="Rectangle: Rounded Corners 23">
+            <a:extLst>
+              <a:ext uri="{FF2B5EF4-FFF2-40B4-BE49-F238E27FC236}">
+                <a16:creationId xmlns:a16="http://schemas.microsoft.com/office/drawing/2014/main" id="{17881AE8-BCDF-4D13-9F9F-1D9BE4B8B918}"/>
+              </a:ext>
+            </a:extLst>
+          </p:cNvPr>
+          <p:cNvSpPr/>
+          <p:nvPr/>
+        </p:nvSpPr>
+        <p:spPr>
+          <a:xfrm>
+            <a:off x="727968" y="4004243"/>
+            <a:ext cx="10635449" cy="1083074"/>
+          </a:xfrm>
+          <a:prstGeom prst="roundRect">
+            <a:avLst/>
+          </a:prstGeom>
+          <a:noFill/>
+          <a:ln w="9525" cap="flat" cmpd="sng" algn="ctr">
+            <a:solidFill>
+              <a:schemeClr val="dk1"/>
+            </a:solidFill>
+            <a:prstDash val="solid"/>
+            <a:round/>
+            <a:headEnd type="none" w="med" len="med"/>
+            <a:tailEnd type="none" w="med" len="med"/>
+          </a:ln>
+        </p:spPr>
+        <p:style>
+          <a:lnRef idx="0">
+            <a:scrgbClr r="0" g="0" b="0"/>
+          </a:lnRef>
+          <a:fillRef idx="0">
+            <a:scrgbClr r="0" g="0" b="0"/>
+          </a:fillRef>
+          <a:effectRef idx="0">
+            <a:scrgbClr r="0" g="0" b="0"/>
+          </a:effectRef>
+          <a:fontRef idx="minor">
+            <a:schemeClr val="dk1"/>
+          </a:fontRef>
+        </p:style>
+        <p:txBody>
+          <a:bodyPr rtlCol="0" anchor="ctr"/>
+          <a:lstStyle/>
+          <a:p>
+            <a:pPr algn="ctr"/>
+            <a:endParaRPr lang="en-US"/>
+          </a:p>
+        </p:txBody>
+      </p:sp>
+      <p:sp>
+        <p:nvSpPr>
+          <p:cNvPr id="25" name="TextBox 24">
+            <a:extLst>
+              <a:ext uri="{FF2B5EF4-FFF2-40B4-BE49-F238E27FC236}">
+                <a16:creationId xmlns:a16="http://schemas.microsoft.com/office/drawing/2014/main" id="{6B6BED32-BFB1-4B55-B183-AB0C770D2249}"/>
+              </a:ext>
+            </a:extLst>
+          </p:cNvPr>
+          <p:cNvSpPr txBox="1"/>
+          <p:nvPr/>
+        </p:nvSpPr>
+        <p:spPr>
+          <a:xfrm>
+            <a:off x="5091342" y="3844604"/>
+            <a:ext cx="1997478" cy="369332"/>
+          </a:xfrm>
+          <a:prstGeom prst="rect">
+            <a:avLst/>
+          </a:prstGeom>
+          <a:ln w="28575"/>
+        </p:spPr>
+        <p:style>
+          <a:lnRef idx="2">
+            <a:schemeClr val="accent5"/>
+          </a:lnRef>
+          <a:fillRef idx="1">
+            <a:schemeClr val="lt1"/>
+          </a:fillRef>
+          <a:effectRef idx="0">
+            <a:schemeClr val="accent5"/>
+          </a:effectRef>
+          <a:fontRef idx="minor">
+            <a:schemeClr val="dk1"/>
+          </a:fontRef>
+        </p:style>
+        <p:txBody>
+          <a:bodyPr wrap="square" rtlCol="0">
+            <a:spAutoFit/>
+          </a:bodyPr>
+          <a:lstStyle/>
+          <a:p>
+            <a:pPr algn="ctr"/>
+            <a:r>
+              <a:rPr lang="en-US" dirty="0" err="1"/>
+              <a:t>GridSearchCV</a:t>
+            </a:r>
+            <a:endParaRPr lang="en-US" dirty="0"/>
+          </a:p>
+        </p:txBody>
+      </p:sp>
+      <p:sp>
+        <p:nvSpPr>
+          <p:cNvPr id="26" name="TextBox 25">
+            <a:extLst>
+              <a:ext uri="{FF2B5EF4-FFF2-40B4-BE49-F238E27FC236}">
+                <a16:creationId xmlns:a16="http://schemas.microsoft.com/office/drawing/2014/main" id="{9ABB3D50-B845-476C-B129-D3E146FA6E63}"/>
+              </a:ext>
+            </a:extLst>
+          </p:cNvPr>
+          <p:cNvSpPr txBox="1"/>
+          <p:nvPr/>
+        </p:nvSpPr>
+        <p:spPr>
+          <a:xfrm>
+            <a:off x="986900" y="4300095"/>
+            <a:ext cx="1429305" cy="400110"/>
+          </a:xfrm>
+          <a:prstGeom prst="rect">
+            <a:avLst/>
+          </a:prstGeom>
+        </p:spPr>
+        <p:style>
+          <a:lnRef idx="3">
+            <a:schemeClr val="lt1"/>
+          </a:lnRef>
+          <a:fillRef idx="1">
+            <a:schemeClr val="accent5"/>
+          </a:fillRef>
+          <a:effectRef idx="1">
+            <a:schemeClr val="accent5"/>
+          </a:effectRef>
+          <a:fontRef idx="minor">
+            <a:schemeClr val="lt1"/>
+          </a:fontRef>
+        </p:style>
+        <p:txBody>
+          <a:bodyPr wrap="square" rtlCol="0">
+            <a:spAutoFit/>
+          </a:bodyPr>
+          <a:lstStyle/>
+          <a:p>
+            <a:pPr algn="ctr"/>
+            <a:r>
+              <a:rPr lang="en-US" sz="2000" dirty="0"/>
+              <a:t>Ridge</a:t>
+            </a:r>
+            <a:endParaRPr lang="en-US" sz="3200" dirty="0"/>
+          </a:p>
+        </p:txBody>
+      </p:sp>
+      <p:sp>
+        <p:nvSpPr>
+          <p:cNvPr id="27" name="TextBox 26">
+            <a:extLst>
+              <a:ext uri="{FF2B5EF4-FFF2-40B4-BE49-F238E27FC236}">
+                <a16:creationId xmlns:a16="http://schemas.microsoft.com/office/drawing/2014/main" id="{451EB1E2-63AA-4E1C-880B-00A43F93ACD0}"/>
+              </a:ext>
+            </a:extLst>
+          </p:cNvPr>
+          <p:cNvSpPr txBox="1"/>
+          <p:nvPr/>
+        </p:nvSpPr>
+        <p:spPr>
+          <a:xfrm>
+            <a:off x="2496105" y="4300094"/>
+            <a:ext cx="1518079" cy="707886"/>
+          </a:xfrm>
+          <a:prstGeom prst="rect">
+            <a:avLst/>
+          </a:prstGeom>
+        </p:spPr>
+        <p:style>
+          <a:lnRef idx="3">
+            <a:schemeClr val="lt1"/>
+          </a:lnRef>
+          <a:fillRef idx="1">
+            <a:schemeClr val="accent5"/>
+          </a:fillRef>
+          <a:effectRef idx="1">
+            <a:schemeClr val="accent5"/>
+          </a:effectRef>
+          <a:fontRef idx="minor">
+            <a:schemeClr val="lt1"/>
+          </a:fontRef>
+        </p:style>
+        <p:txBody>
+          <a:bodyPr wrap="square" rtlCol="0">
+            <a:spAutoFit/>
+          </a:bodyPr>
+          <a:lstStyle/>
+          <a:p>
+            <a:pPr algn="ctr"/>
+            <a:r>
+              <a:rPr lang="en-US" sz="2000" dirty="0"/>
+              <a:t>Elastic </a:t>
+            </a:r>
+          </a:p>
+          <a:p>
+            <a:pPr algn="ctr"/>
+            <a:r>
+              <a:rPr lang="en-US" sz="2000" dirty="0"/>
+              <a:t>Net</a:t>
+            </a:r>
+          </a:p>
+        </p:txBody>
+      </p:sp>
+      <p:sp>
+        <p:nvSpPr>
+          <p:cNvPr id="28" name="TextBox 27">
+            <a:extLst>
+              <a:ext uri="{FF2B5EF4-FFF2-40B4-BE49-F238E27FC236}">
+                <a16:creationId xmlns:a16="http://schemas.microsoft.com/office/drawing/2014/main" id="{EB6D925A-3E60-491C-ACCC-D58B675DC5B7}"/>
+              </a:ext>
+            </a:extLst>
+          </p:cNvPr>
+          <p:cNvSpPr txBox="1"/>
+          <p:nvPr/>
+        </p:nvSpPr>
+        <p:spPr>
+          <a:xfrm>
+            <a:off x="4094084" y="4300094"/>
+            <a:ext cx="1757038" cy="707886"/>
+          </a:xfrm>
+          <a:prstGeom prst="rect">
+            <a:avLst/>
+          </a:prstGeom>
+        </p:spPr>
+        <p:style>
+          <a:lnRef idx="3">
+            <a:schemeClr val="lt1"/>
+          </a:lnRef>
+          <a:fillRef idx="1">
+            <a:schemeClr val="accent5"/>
+          </a:fillRef>
+          <a:effectRef idx="1">
+            <a:schemeClr val="accent5"/>
+          </a:effectRef>
+          <a:fontRef idx="minor">
+            <a:schemeClr val="lt1"/>
+          </a:fontRef>
+        </p:style>
+        <p:txBody>
+          <a:bodyPr wrap="square" rtlCol="0">
+            <a:spAutoFit/>
+          </a:bodyPr>
+          <a:lstStyle/>
+          <a:p>
+            <a:pPr algn="ctr"/>
+            <a:r>
+              <a:rPr lang="en-US" sz="2000" dirty="0"/>
+              <a:t>Random</a:t>
+            </a:r>
+          </a:p>
+          <a:p>
+            <a:pPr algn="ctr"/>
+            <a:r>
+              <a:rPr lang="en-US" sz="2000" dirty="0"/>
+              <a:t>Forest</a:t>
+            </a:r>
+          </a:p>
+        </p:txBody>
+      </p:sp>
+      <p:sp>
+        <p:nvSpPr>
+          <p:cNvPr id="29" name="TextBox 28">
+            <a:extLst>
+              <a:ext uri="{FF2B5EF4-FFF2-40B4-BE49-F238E27FC236}">
+                <a16:creationId xmlns:a16="http://schemas.microsoft.com/office/drawing/2014/main" id="{1CAC2CAE-1E1B-470B-A443-640628DDEB9D}"/>
+              </a:ext>
+            </a:extLst>
+          </p:cNvPr>
+          <p:cNvSpPr txBox="1"/>
+          <p:nvPr/>
+        </p:nvSpPr>
+        <p:spPr>
+          <a:xfrm>
+            <a:off x="5931022" y="4287350"/>
+            <a:ext cx="1694895" cy="707886"/>
+          </a:xfrm>
+          <a:prstGeom prst="rect">
+            <a:avLst/>
+          </a:prstGeom>
+        </p:spPr>
+        <p:style>
+          <a:lnRef idx="3">
+            <a:schemeClr val="lt1"/>
+          </a:lnRef>
+          <a:fillRef idx="1">
+            <a:schemeClr val="accent5"/>
+          </a:fillRef>
+          <a:effectRef idx="1">
+            <a:schemeClr val="accent5"/>
+          </a:effectRef>
+          <a:fontRef idx="minor">
+            <a:schemeClr val="lt1"/>
+          </a:fontRef>
+        </p:style>
+        <p:txBody>
+          <a:bodyPr wrap="square" rtlCol="0">
+            <a:spAutoFit/>
+          </a:bodyPr>
+          <a:lstStyle/>
+          <a:p>
+            <a:pPr algn="ctr"/>
+            <a:r>
+              <a:rPr lang="en-US" sz="2000" dirty="0"/>
+              <a:t>Extra </a:t>
+            </a:r>
+          </a:p>
+          <a:p>
+            <a:pPr algn="ctr"/>
+            <a:r>
+              <a:rPr lang="en-US" sz="2000" dirty="0"/>
+              <a:t>Tree</a:t>
+            </a:r>
+          </a:p>
+        </p:txBody>
+      </p:sp>
+      <p:sp>
+        <p:nvSpPr>
+          <p:cNvPr id="30" name="TextBox 29">
+            <a:extLst>
+              <a:ext uri="{FF2B5EF4-FFF2-40B4-BE49-F238E27FC236}">
+                <a16:creationId xmlns:a16="http://schemas.microsoft.com/office/drawing/2014/main" id="{F5C28817-5C48-4180-816F-F271EED94ED3}"/>
+              </a:ext>
+            </a:extLst>
+          </p:cNvPr>
+          <p:cNvSpPr txBox="1"/>
+          <p:nvPr/>
+        </p:nvSpPr>
+        <p:spPr>
+          <a:xfrm>
+            <a:off x="7705817" y="4287350"/>
+            <a:ext cx="1694895" cy="707886"/>
+          </a:xfrm>
+          <a:prstGeom prst="rect">
+            <a:avLst/>
+          </a:prstGeom>
+        </p:spPr>
+        <p:style>
+          <a:lnRef idx="3">
+            <a:schemeClr val="lt1"/>
+          </a:lnRef>
+          <a:fillRef idx="1">
+            <a:schemeClr val="accent5"/>
+          </a:fillRef>
+          <a:effectRef idx="1">
+            <a:schemeClr val="accent5"/>
+          </a:effectRef>
+          <a:fontRef idx="minor">
+            <a:schemeClr val="lt1"/>
+          </a:fontRef>
+        </p:style>
+        <p:txBody>
+          <a:bodyPr wrap="square" rtlCol="0">
+            <a:spAutoFit/>
+          </a:bodyPr>
+          <a:lstStyle/>
+          <a:p>
+            <a:pPr algn="ctr"/>
+            <a:r>
+              <a:rPr lang="en-US" sz="2000" dirty="0"/>
+              <a:t>Gradient Boosting</a:t>
+            </a:r>
+          </a:p>
+        </p:txBody>
+      </p:sp>
+      <p:sp>
+        <p:nvSpPr>
+          <p:cNvPr id="31" name="TextBox 30">
+            <a:extLst>
+              <a:ext uri="{FF2B5EF4-FFF2-40B4-BE49-F238E27FC236}">
+                <a16:creationId xmlns:a16="http://schemas.microsoft.com/office/drawing/2014/main" id="{D8CACA8C-7478-4690-BBA8-F4F7714A271C}"/>
+              </a:ext>
+            </a:extLst>
+          </p:cNvPr>
+          <p:cNvSpPr txBox="1"/>
+          <p:nvPr/>
+        </p:nvSpPr>
+        <p:spPr>
+          <a:xfrm>
+            <a:off x="9416990" y="4287350"/>
+            <a:ext cx="1694895" cy="707886"/>
+          </a:xfrm>
+          <a:prstGeom prst="rect">
+            <a:avLst/>
+          </a:prstGeom>
+        </p:spPr>
+        <p:style>
+          <a:lnRef idx="3">
+            <a:schemeClr val="lt1"/>
+          </a:lnRef>
+          <a:fillRef idx="1">
+            <a:schemeClr val="accent5"/>
+          </a:fillRef>
+          <a:effectRef idx="1">
+            <a:schemeClr val="accent5"/>
+          </a:effectRef>
+          <a:fontRef idx="minor">
+            <a:schemeClr val="lt1"/>
+          </a:fontRef>
+        </p:style>
+        <p:txBody>
+          <a:bodyPr wrap="square" rtlCol="0">
+            <a:spAutoFit/>
+          </a:bodyPr>
+          <a:lstStyle/>
+          <a:p>
+            <a:pPr algn="ctr"/>
+            <a:r>
+              <a:rPr lang="en-US" sz="2000" dirty="0"/>
               <a:t>Neural Network</a:t>
             </a:r>
           </a:p>

</xml_diff>